<commit_message>
adjusted image def file example + how to build on secure server
</commit_message>
<xml_diff>
--- a/Basic git and singularity.pptx
+++ b/Basic git and singularity.pptx
@@ -5,10 +5,10 @@
     <p:sldMasterId id="2147483648" r:id="rId1"/>
   </p:sldMasterIdLst>
   <p:notesMasterIdLst>
-    <p:notesMasterId r:id="rId15"/>
+    <p:notesMasterId r:id="rId16"/>
   </p:notesMasterIdLst>
   <p:handoutMasterIdLst>
-    <p:handoutMasterId r:id="rId16"/>
+    <p:handoutMasterId r:id="rId17"/>
   </p:handoutMasterIdLst>
   <p:sldIdLst>
     <p:sldId id="256" r:id="rId3"/>
@@ -23,6 +23,7 @@
     <p:sldId id="264" r:id="rId12"/>
     <p:sldId id="268" r:id="rId13"/>
     <p:sldId id="266" r:id="rId14"/>
+    <p:sldId id="275" r:id="rId15"/>
   </p:sldIdLst>
   <p:sldSz cx="12192000" cy="6858000"/>
   <p:notesSz cx="7103745" cy="10234295"/>
@@ -3557,10 +3558,10 @@
           </a:bodyPr>
           <a:p>
             <a:r>
-              <a:rPr lang="" altLang="en-US"/>
+              <a:rPr lang="en-US" altLang="en-US"/>
               <a:t>Basic git and singularity</a:t>
             </a:r>
-            <a:endParaRPr lang="" altLang="en-US"/>
+            <a:endParaRPr lang="en-US" altLang="en-US"/>
           </a:p>
         </p:txBody>
       </p:sp>
@@ -3579,27 +3580,27 @@
           <a:bodyPr/>
           <a:p>
             <a:r>
-              <a:rPr lang="" altLang="en-US"/>
+              <a:rPr lang="en-US" altLang="en-US"/>
               <a:t>COVID-19 project at AAU</a:t>
             </a:r>
-            <a:endParaRPr lang="" altLang="en-US"/>
-          </a:p>
-          <a:p>
-            <a:r>
-              <a:rPr lang="" altLang="en-US"/>
+            <a:endParaRPr lang="en-US" altLang="en-US"/>
+          </a:p>
+          <a:p>
+            <a:r>
+              <a:rPr lang="en-US" altLang="en-US"/>
               <a:t>Kasper Skytte Andersen</a:t>
             </a:r>
             <a:br>
-              <a:rPr lang="" altLang="en-US"/>
+              <a:rPr lang="en-US" altLang="en-US"/>
             </a:br>
-            <a:endParaRPr lang="" altLang="en-US"/>
-          </a:p>
-          <a:p>
-            <a:r>
-              <a:rPr lang="" altLang="en-US"/>
+            <a:endParaRPr lang="en-US" altLang="en-US"/>
+          </a:p>
+          <a:p>
+            <a:r>
+              <a:rPr lang="en-US" altLang="en-US"/>
               <a:t>(not to be presented)</a:t>
             </a:r>
-            <a:endParaRPr lang="" altLang="en-US"/>
+            <a:endParaRPr lang="en-US" altLang="en-US"/>
           </a:p>
         </p:txBody>
       </p:sp>
@@ -3636,10 +3637,10 @@
           <a:bodyPr/>
           <a:p>
             <a:r>
-              <a:rPr lang="" altLang="en-US"/>
+              <a:rPr lang="en-US" altLang="en-US"/>
               <a:t>Singularity containers</a:t>
             </a:r>
-            <a:endParaRPr lang="" altLang="en-US"/>
+            <a:endParaRPr lang="en-US" altLang="en-US"/>
           </a:p>
         </p:txBody>
       </p:sp>
@@ -3658,80 +3659,80 @@
           <a:bodyPr/>
           <a:p>
             <a:r>
-              <a:rPr lang="" altLang="en-US"/>
+              <a:rPr lang="en-US" altLang="en-US"/>
               <a:t>Integration over isolation</a:t>
             </a:r>
-            <a:endParaRPr lang="" altLang="en-US"/>
-          </a:p>
-          <a:p>
-            <a:r>
-              <a:rPr lang="" altLang="en-US"/>
+            <a:endParaRPr lang="en-US" altLang="en-US"/>
+          </a:p>
+          <a:p>
+            <a:r>
+              <a:rPr lang="en-US" altLang="en-US"/>
               <a:t>Does not require elevated privileges like docker (though rootless docker exists)</a:t>
             </a:r>
-            <a:endParaRPr lang="" altLang="en-US"/>
-          </a:p>
-          <a:p>
-            <a:r>
-              <a:rPr lang="" altLang="en-US"/>
+            <a:endParaRPr lang="en-US" altLang="en-US"/>
+          </a:p>
+          <a:p>
+            <a:r>
+              <a:rPr lang="en-US" altLang="en-US"/>
               <a:t>Boils down any workflow into a single, portable, image file, including:</a:t>
             </a:r>
-            <a:endParaRPr lang="" altLang="en-US"/>
+            <a:endParaRPr lang="en-US" altLang="en-US"/>
           </a:p>
           <a:p>
             <a:pPr lvl="1"/>
             <a:r>
-              <a:rPr lang="" altLang="en-US"/>
+              <a:rPr lang="en-US" altLang="en-US"/>
               <a:t>OS (only Linux)</a:t>
             </a:r>
-            <a:endParaRPr lang="" altLang="en-US"/>
+            <a:endParaRPr lang="en-US" altLang="en-US"/>
           </a:p>
           <a:p>
             <a:pPr lvl="1"/>
             <a:r>
-              <a:rPr lang="" altLang="en-US"/>
+              <a:rPr lang="en-US" altLang="en-US"/>
               <a:t>All required software tools</a:t>
             </a:r>
-            <a:endParaRPr lang="" altLang="en-US"/>
+            <a:endParaRPr lang="en-US" altLang="en-US"/>
           </a:p>
           <a:p>
             <a:pPr lvl="1"/>
             <a:r>
-              <a:rPr lang="" altLang="en-US"/>
+              <a:rPr lang="en-US" altLang="en-US"/>
               <a:t>Scripts</a:t>
             </a:r>
-            <a:endParaRPr lang="" altLang="en-US"/>
+            <a:endParaRPr lang="en-US" altLang="en-US"/>
           </a:p>
           <a:p>
             <a:pPr lvl="0"/>
             <a:r>
-              <a:rPr lang="" altLang="en-US"/>
+              <a:rPr lang="en-US" altLang="en-US"/>
               <a:t>Start a container based on the image, provide input data, get output!</a:t>
             </a:r>
-            <a:endParaRPr lang="" altLang="en-US"/>
+            <a:endParaRPr lang="en-US" altLang="en-US"/>
           </a:p>
           <a:p>
             <a:pPr lvl="0"/>
             <a:r>
-              <a:rPr lang="" altLang="en-US">
-                <a:hlinkClick r:id="rId1" tooltip="" action="ppaction://hlinkfile"/>
+              <a:rPr lang="en-US" altLang="en-US">
+                <a:hlinkClick r:id="rId1" action="ppaction://hlinkfile"/>
               </a:rPr>
               <a:t>https://sylabs.io/guides/3.5/user-guide/index.html</a:t>
             </a:r>
-            <a:endParaRPr lang="" altLang="en-US"/>
+            <a:endParaRPr lang="en-US" altLang="en-US"/>
           </a:p>
           <a:p>
             <a:pPr lvl="0"/>
             <a:r>
-              <a:rPr lang="" altLang="en-US"/>
+              <a:rPr lang="en-US" altLang="en-US"/>
               <a:t>5 min intro here: </a:t>
             </a:r>
             <a:r>
-              <a:rPr lang="" altLang="en-US">
-                <a:hlinkClick r:id="rId2" tooltip="" action="ppaction://hlinkfile"/>
+              <a:rPr lang="en-US" altLang="en-US">
+                <a:hlinkClick r:id="rId2" action="ppaction://hlinkfile"/>
               </a:rPr>
               <a:t>https://www.youtube.com/watch?v=m8llDjFuXlc</a:t>
             </a:r>
-            <a:endParaRPr lang="" altLang="en-US"/>
+            <a:endParaRPr lang="en-US" altLang="en-US"/>
           </a:p>
         </p:txBody>
       </p:sp>
@@ -3768,10 +3769,10 @@
           <a:bodyPr/>
           <a:p>
             <a:r>
-              <a:rPr lang="" altLang="en-US"/>
+              <a:rPr lang="en-US" altLang="en-US"/>
               <a:t>Containers in general</a:t>
             </a:r>
-            <a:endParaRPr lang="" altLang="en-US"/>
+            <a:endParaRPr lang="en-US" altLang="en-US"/>
           </a:p>
         </p:txBody>
       </p:sp>
@@ -3831,7 +3832,7 @@
         <p:spPr>
           <a:xfrm>
             <a:off x="3596640" y="2679700"/>
-            <a:ext cx="4140835" cy="2263775"/>
+            <a:ext cx="2592070" cy="3230880"/>
           </a:xfrm>
           <a:prstGeom prst="straightConnector1">
             <a:avLst/>
@@ -3873,10 +3874,10 @@
           <a:bodyPr/>
           <a:p>
             <a:r>
-              <a:rPr lang="" altLang="en-US"/>
+              <a:rPr lang="en-US" altLang="en-US"/>
               <a:t>Singularity + git</a:t>
             </a:r>
-            <a:endParaRPr lang="" altLang="en-US"/>
+            <a:endParaRPr lang="en-US" altLang="en-US"/>
           </a:p>
         </p:txBody>
       </p:sp>
@@ -3907,31 +3908,47 @@
           </a:bodyPr>
           <a:p>
             <a:r>
+              <a:rPr lang="en-US" altLang="en-US"/>
+              <a:t>- </a:t>
+            </a:r>
+            <a:r>
               <a:rPr lang="" altLang="en-US"/>
-              <a:t>- script1.sh</a:t>
-            </a:r>
-            <a:endParaRPr lang="" altLang="en-US"/>
-          </a:p>
-          <a:p>
+              <a:t>basecalldemux</a:t>
+            </a:r>
+            <a:r>
+              <a:rPr lang="en-US" altLang="en-US"/>
+              <a:t>.sh</a:t>
+            </a:r>
+            <a:endParaRPr lang="en-US" altLang="en-US"/>
+          </a:p>
+          <a:p>
+            <a:r>
+              <a:rPr lang="en-US" altLang="en-US"/>
+              <a:t>- </a:t>
+            </a:r>
             <a:r>
               <a:rPr lang="" altLang="en-US"/>
-              <a:t>- script2.sh</a:t>
-            </a:r>
-            <a:endParaRPr lang="" altLang="en-US"/>
-          </a:p>
-          <a:p>
-            <a:r>
-              <a:rPr lang="" altLang="en-US"/>
+              <a:t>nextstrain</a:t>
+            </a:r>
+            <a:r>
+              <a:rPr lang="en-US" altLang="en-US"/>
+              <a:t>.sh</a:t>
+            </a:r>
+            <a:endParaRPr lang="en-US" altLang="en-US"/>
+          </a:p>
+          <a:p>
+            <a:r>
+              <a:rPr lang="en-US" altLang="en-US"/>
               <a:t>- covid19.singularity</a:t>
             </a:r>
-            <a:endParaRPr lang="" altLang="en-US"/>
-          </a:p>
-          <a:p>
-            <a:r>
-              <a:rPr lang="" altLang="en-US"/>
+            <a:endParaRPr lang="en-US" altLang="en-US"/>
+          </a:p>
+          <a:p>
+            <a:r>
+              <a:rPr lang="en-US" altLang="en-US"/>
               <a:t>- ...</a:t>
             </a:r>
-            <a:endParaRPr lang="" altLang="en-US"/>
+            <a:endParaRPr lang="en-US" altLang="en-US"/>
           </a:p>
         </p:txBody>
       </p:sp>
@@ -3943,8 +3960,8 @@
         </p:nvSpPr>
         <p:spPr>
           <a:xfrm>
-            <a:off x="3367405" y="4943475"/>
-            <a:ext cx="8740140" cy="645160"/>
+            <a:off x="385445" y="5910580"/>
+            <a:ext cx="11606530" cy="922020"/>
           </a:xfrm>
           <a:prstGeom prst="rect">
             <a:avLst/>
@@ -3962,11 +3979,66 @@
           </a:bodyPr>
           <a:p>
             <a:r>
+              <a:rPr lang="en-US" altLang="en-US">
+                <a:latin typeface="FreeMono" panose="020F0409020205020404" charset="0"/>
+                <a:cs typeface="FreeMono" panose="020F0409020205020404" charset="0"/>
+              </a:rPr>
+              <a:t>$ singularity run --app </a:t>
+            </a:r>
+            <a:r>
               <a:rPr lang="" altLang="en-US">
                 <a:latin typeface="FreeMono" panose="020F0409020205020404" charset="0"/>
                 <a:cs typeface="FreeMono" panose="020F0409020205020404" charset="0"/>
               </a:rPr>
-              <a:t>$ singularity run --app script1.sh covid19.sif /input/data</a:t>
+              <a:t>gogobasecalldemux</a:t>
+            </a:r>
+            <a:r>
+              <a:rPr lang="en-US" altLang="en-US">
+                <a:latin typeface="FreeMono" panose="020F0409020205020404" charset="0"/>
+                <a:cs typeface="FreeMono" panose="020F0409020205020404" charset="0"/>
+              </a:rPr>
+              <a:t> covid19.sif </a:t>
+            </a:r>
+            <a:r>
+              <a:rPr lang="" altLang="en-US">
+                <a:latin typeface="FreeMono" panose="020F0409020205020404" charset="0"/>
+                <a:cs typeface="FreeMono" panose="020F0409020205020404" charset="0"/>
+              </a:rPr>
+              <a:t>-i fast5/ -o fastq/</a:t>
+            </a:r>
+            <a:endParaRPr lang="en-US" altLang="en-US">
+              <a:latin typeface="FreeMono" panose="020F0409020205020404" charset="0"/>
+              <a:cs typeface="FreeMono" panose="020F0409020205020404" charset="0"/>
+            </a:endParaRPr>
+          </a:p>
+          <a:p>
+            <a:r>
+              <a:rPr lang="en-US" altLang="en-US">
+                <a:latin typeface="FreeMono" panose="020F0409020205020404" charset="0"/>
+                <a:cs typeface="FreeMono" panose="020F0409020205020404" charset="0"/>
+              </a:rPr>
+              <a:t>$ singularity run --app </a:t>
+            </a:r>
+            <a:r>
+              <a:rPr lang="" altLang="en-US">
+                <a:latin typeface="FreeMono" panose="020F0409020205020404" charset="0"/>
+                <a:cs typeface="FreeMono" panose="020F0409020205020404" charset="0"/>
+              </a:rPr>
+              <a:t>gogonextstrain</a:t>
+            </a:r>
+            <a:r>
+              <a:rPr lang="en-US" altLang="en-US">
+                <a:latin typeface="FreeMono" panose="020F0409020205020404" charset="0"/>
+                <a:cs typeface="FreeMono" panose="020F0409020205020404" charset="0"/>
+              </a:rPr>
+              <a:t> covid19.sif </a:t>
+            </a:r>
+            <a:r>
+              <a:rPr lang="" altLang="en-US">
+                <a:latin typeface="FreeMono" panose="020F0409020205020404" charset="0"/>
+                <a:cs typeface="FreeMono" panose="020F0409020205020404" charset="0"/>
+              </a:rPr>
+              <a:t>-i fastq/ -o somefolder/</a:t>
             </a:r>
             <a:endParaRPr lang="" altLang="en-US">
               <a:latin typeface="FreeMono" panose="020F0409020205020404" charset="0"/>
@@ -3979,7 +4051,7 @@
                 <a:latin typeface="FreeMono" panose="020F0409020205020404" charset="0"/>
                 <a:cs typeface="FreeMono" panose="020F0409020205020404" charset="0"/>
               </a:rPr>
-              <a:t>$ singularity run --app script2.sh covid19.sif /input/data</a:t>
+              <a:t>$ singularity run --app gogoQC covid19.sif -i somefolder/</a:t>
             </a:r>
             <a:endParaRPr lang="" altLang="en-US">
               <a:latin typeface="FreeMono" panose="020F0409020205020404" charset="0"/>
@@ -4010,10 +4082,10 @@
           </a:bodyPr>
           <a:p>
             <a:r>
-              <a:rPr lang="" altLang="en-US" b="1"/>
+              <a:rPr lang="en-US" altLang="en-US" b="1"/>
               <a:t>covid19 git repository</a:t>
             </a:r>
-            <a:endParaRPr lang="" altLang="en-US" b="1"/>
+            <a:endParaRPr lang="en-US" altLang="en-US" b="1"/>
           </a:p>
         </p:txBody>
       </p:sp>
@@ -4025,7 +4097,7 @@
         </p:nvSpPr>
         <p:spPr>
           <a:xfrm>
-            <a:off x="-12065" y="4943475"/>
+            <a:off x="300990" y="5170170"/>
             <a:ext cx="3379470" cy="645160"/>
           </a:xfrm>
           <a:prstGeom prst="rect">
@@ -4039,10 +4111,10 @@
           </a:bodyPr>
           <a:p>
             <a:r>
-              <a:rPr lang="" altLang="en-US"/>
+              <a:rPr lang="en-US" altLang="en-US"/>
               <a:t>Start container on host and run scripts with input data</a:t>
             </a:r>
-            <a:endParaRPr lang="" altLang="en-US"/>
+            <a:endParaRPr lang="en-US" altLang="en-US"/>
           </a:p>
         </p:txBody>
       </p:sp>
@@ -4054,7 +4126,7 @@
         </p:nvSpPr>
         <p:spPr>
           <a:xfrm>
-            <a:off x="3915410" y="2080260"/>
+            <a:off x="897890" y="3834130"/>
             <a:ext cx="3746500" cy="922020"/>
           </a:xfrm>
           <a:prstGeom prst="rect">
@@ -4068,26 +4140,59 @@
           </a:bodyPr>
           <a:p>
             <a:r>
-              <a:rPr lang="" altLang="en-US"/>
+              <a:rPr lang="en-US" altLang="en-US"/>
               <a:t>Build singularity image based on </a:t>
+            </a:r>
+            <a:r>
+              <a:rPr lang="en-US" altLang="en-US">
+                <a:sym typeface="+mn-ea"/>
+              </a:rPr>
+              <a:t>definition file</a:t>
             </a:r>
             <a:r>
               <a:rPr lang="" altLang="en-US">
                 <a:sym typeface="+mn-ea"/>
               </a:rPr>
-              <a:t>definition file </a:t>
-            </a:r>
-            <a:r>
-              <a:rPr lang="" altLang="en-US"/>
-              <a:t>that also contains scripts</a:t>
-            </a:r>
-            <a:endParaRPr lang="" altLang="en-US"/>
+              <a:t>, copy all workflow scripts along</a:t>
+            </a:r>
+            <a:endParaRPr lang="" altLang="en-US">
+              <a:sym typeface="+mn-ea"/>
+            </a:endParaRPr>
+          </a:p>
+        </p:txBody>
+      </p:sp>
+      <p:sp>
+        <p:nvSpPr>
+          <p:cNvPr id="13" name="Text Box 12"/>
+          <p:cNvSpPr txBox="1"/>
+          <p:nvPr/>
+        </p:nvSpPr>
+        <p:spPr>
+          <a:xfrm>
+            <a:off x="7661910" y="-22225"/>
+            <a:ext cx="3519805" cy="368300"/>
+          </a:xfrm>
+          <a:prstGeom prst="rect">
+            <a:avLst/>
+          </a:prstGeom>
+          <a:noFill/>
+        </p:spPr>
+        <p:txBody>
+          <a:bodyPr wrap="none" rtlCol="0">
+            <a:spAutoFit/>
+          </a:bodyPr>
+          <a:p>
+            <a:r>
+              <a:rPr lang="en-US" altLang="en-US"/>
+              <a:t>example image definition file</a:t>
+            </a:r>
+            <a:endParaRPr lang="en-US" altLang="en-US"/>
           </a:p>
         </p:txBody>
       </p:sp>
       <p:pic>
         <p:nvPicPr>
-          <p:cNvPr id="12" name="Picture 11"/>
+          <p:cNvPr id="3" name="Picture 2"/>
           <p:cNvPicPr>
             <a:picLocks noChangeAspect="1"/>
           </p:cNvPicPr>
@@ -4101,39 +4206,146 @@
         </p:blipFill>
         <p:spPr>
           <a:xfrm>
-            <a:off x="7573645" y="346075"/>
-            <a:ext cx="4533900" cy="4391025"/>
+            <a:off x="7225030" y="346075"/>
+            <a:ext cx="4861560" cy="5345430"/>
           </a:xfrm>
           <a:prstGeom prst="rect">
             <a:avLst/>
           </a:prstGeom>
         </p:spPr>
       </p:pic>
-      <p:sp>
-        <p:nvSpPr>
-          <p:cNvPr id="13" name="Text Box 12"/>
-          <p:cNvSpPr txBox="1"/>
-          <p:nvPr/>
-        </p:nvSpPr>
-        <p:spPr>
-          <a:xfrm>
-            <a:off x="7661910" y="-22225"/>
-            <a:ext cx="3519805" cy="368300"/>
-          </a:xfrm>
-          <a:prstGeom prst="rect">
-            <a:avLst/>
-          </a:prstGeom>
-          <a:noFill/>
-        </p:spPr>
-        <p:txBody>
-          <a:bodyPr wrap="none" rtlCol="0">
-            <a:spAutoFit/>
-          </a:bodyPr>
+    </p:spTree>
+  </p:cSld>
+  <p:clrMapOvr>
+    <a:masterClrMapping/>
+  </p:clrMapOvr>
+</p:sld>
+</file>
+
+<file path=ppt/slides/slide13.xml><?xml version="1.0" encoding="utf-8"?>
+<p:sld xmlns:a="http://schemas.openxmlformats.org/drawingml/2006/main" xmlns:r="http://schemas.openxmlformats.org/officeDocument/2006/relationships" xmlns:p="http://schemas.openxmlformats.org/presentationml/2006/main">
+  <p:cSld>
+    <p:spTree>
+      <p:nvGrpSpPr>
+        <p:cNvPr id="1" name=""/>
+        <p:cNvGrpSpPr/>
+        <p:nvPr/>
+      </p:nvGrpSpPr>
+      <p:grpSpPr/>
+      <p:sp>
+        <p:nvSpPr>
+          <p:cNvPr id="2" name="Title 1"/>
+          <p:cNvSpPr>
+            <a:spLocks noGrp="1"/>
+          </p:cNvSpPr>
+          <p:nvPr>
+            <p:ph type="title"/>
+          </p:nvPr>
+        </p:nvSpPr>
+        <p:spPr/>
+        <p:txBody>
+          <a:bodyPr/>
           <a:p>
             <a:r>
               <a:rPr lang="" altLang="en-US"/>
-              <a:t>example image definition file</a:t>
-            </a:r>
+              <a:t>Building singularity image on the secure server</a:t>
+            </a:r>
+            <a:endParaRPr lang="" altLang="en-US"/>
+          </a:p>
+        </p:txBody>
+      </p:sp>
+      <p:sp>
+        <p:nvSpPr>
+          <p:cNvPr id="3" name="Content Placeholder 2"/>
+          <p:cNvSpPr>
+            <a:spLocks noGrp="1"/>
+          </p:cNvSpPr>
+          <p:nvPr>
+            <p:ph idx="1"/>
+          </p:nvPr>
+        </p:nvSpPr>
+        <p:spPr/>
+        <p:txBody>
+          <a:bodyPr/>
+          <a:p>
+            <a:r>
+              <a:rPr lang="en-US" altLang="en-US">
+                <a:sym typeface="+mn-ea"/>
+              </a:rPr>
+              <a:t>Go to a clone of the github repo (you should only be working in your own)</a:t>
+            </a:r>
+            <a:endParaRPr lang="" altLang="en-US"/>
+          </a:p>
+          <a:p>
+            <a:r>
+              <a:rPr lang="" altLang="en-US"/>
+              <a:t>Update app definitions if neccessary (probably only once, the first time) in </a:t>
+            </a:r>
+            <a:r>
+              <a:rPr lang="" altLang="en-US">
+                <a:latin typeface="FreeMono" panose="020F0409020205020404" charset="0"/>
+                <a:cs typeface="FreeMono" panose="020F0409020205020404" charset="0"/>
+              </a:rPr>
+              <a:t>covid19.singularity</a:t>
+            </a:r>
+            <a:endParaRPr lang="" altLang="en-US"/>
+          </a:p>
+          <a:p>
+            <a:r>
+              <a:rPr lang="" altLang="en-US"/>
+              <a:t>Hit </a:t>
+            </a:r>
+            <a:r>
+              <a:rPr lang="" altLang="en-US">
+                <a:latin typeface="FreeMono" panose="020F0409020205020404" charset="0"/>
+                <a:cs typeface="FreeMono" panose="020F0409020205020404" charset="0"/>
+              </a:rPr>
+              <a:t>make</a:t>
+            </a:r>
+            <a:r>
+              <a:rPr lang="" altLang="en-US"/>
+              <a:t> while in the </a:t>
+            </a:r>
+            <a:r>
+              <a:rPr lang="" altLang="en-US">
+                <a:latin typeface="FreeMono" panose="020F0409020205020404" charset="0"/>
+                <a:cs typeface="FreeMono" panose="020F0409020205020404" charset="0"/>
+              </a:rPr>
+              <a:t>singularity/</a:t>
+            </a:r>
+            <a:r>
+              <a:rPr lang="" altLang="en-US"/>
+              <a:t> subfolder</a:t>
+            </a:r>
+            <a:endParaRPr lang="" altLang="en-US"/>
+          </a:p>
+          <a:p>
+            <a:pPr lvl="1"/>
+            <a:r>
+              <a:rPr lang="" altLang="en-US" sz="1800"/>
+              <a:t>This will build base image and the main image on top into 2 </a:t>
+            </a:r>
+            <a:r>
+              <a:rPr lang="" altLang="en-US" sz="1800">
+                <a:latin typeface="FreeMono" panose="020F0409020205020404" charset="0"/>
+                <a:cs typeface="FreeMono" panose="020F0409020205020404" charset="0"/>
+              </a:rPr>
+              <a:t>.sif</a:t>
+            </a:r>
+            <a:r>
+              <a:rPr lang="" altLang="en-US" sz="1800"/>
+              <a:t> files</a:t>
+            </a:r>
+            <a:endParaRPr lang="" altLang="en-US"/>
+          </a:p>
+          <a:p>
+            <a:r>
+              <a:rPr lang="" altLang="en-US"/>
+              <a:t>(Merge into workstations branch if neccessary)</a:t>
+            </a:r>
+            <a:endParaRPr lang="" altLang="en-US"/>
+          </a:p>
+          <a:p>
             <a:endParaRPr lang="" altLang="en-US"/>
           </a:p>
         </p:txBody>
@@ -4176,10 +4388,10 @@
           <a:bodyPr/>
           <a:p>
             <a:r>
-              <a:rPr lang="" altLang="en-US"/>
+              <a:rPr lang="en-US" altLang="en-US"/>
               <a:t>Git basics</a:t>
             </a:r>
-            <a:endParaRPr lang="" altLang="en-US"/>
+            <a:endParaRPr lang="en-US" altLang="en-US"/>
           </a:p>
         </p:txBody>
       </p:sp>
@@ -4198,102 +4410,102 @@
           <a:bodyPr/>
           <a:p>
             <a:r>
-              <a:rPr lang="" altLang="en-US"/>
+              <a:rPr lang="en-US" altLang="en-US"/>
               <a:t>4 main phases in the lifecycle of a git repository (visualised next slide):</a:t>
             </a:r>
-            <a:endParaRPr lang="" altLang="en-US"/>
+            <a:endParaRPr lang="en-US" altLang="en-US"/>
           </a:p>
           <a:p>
             <a:pPr lvl="1"/>
             <a:r>
-              <a:rPr lang="" altLang="en-US" sz="1800"/>
+              <a:rPr lang="en-US" altLang="en-US" sz="1800"/>
               <a:t>remote repo</a:t>
             </a:r>
-            <a:endParaRPr lang="" altLang="en-US" sz="1800"/>
+            <a:endParaRPr lang="en-US" altLang="en-US" sz="1800"/>
           </a:p>
           <a:p>
             <a:pPr lvl="2"/>
             <a:r>
-              <a:rPr lang="" altLang="en-US" sz="1600"/>
+              <a:rPr lang="en-US" altLang="en-US" sz="1600"/>
               <a:t>A tracked repository (by git), can be more than 1 (eg from forks). Main repo is the “origin”</a:t>
             </a:r>
-            <a:endParaRPr lang="" altLang="en-US" sz="1600"/>
+            <a:endParaRPr lang="en-US" altLang="en-US" sz="1600"/>
           </a:p>
           <a:p>
             <a:pPr lvl="1"/>
             <a:r>
-              <a:rPr lang="" altLang="en-US" sz="1800"/>
+              <a:rPr lang="en-US" altLang="en-US" sz="1800"/>
               <a:t>local repo</a:t>
             </a:r>
-            <a:endParaRPr lang="" altLang="en-US" sz="1800"/>
+            <a:endParaRPr lang="en-US" altLang="en-US" sz="1800"/>
           </a:p>
           <a:p>
             <a:pPr lvl="2"/>
             <a:r>
-              <a:rPr lang="" altLang="en-US" sz="1600"/>
+              <a:rPr lang="en-US" altLang="en-US" sz="1600"/>
               <a:t>“cloned” from a remote (mostly the origin)</a:t>
             </a:r>
-            <a:endParaRPr lang="" altLang="en-US"/>
+            <a:endParaRPr lang="en-US" altLang="en-US"/>
           </a:p>
           <a:p>
             <a:pPr lvl="1"/>
             <a:r>
-              <a:rPr lang="" altLang="en-US"/>
+              <a:rPr lang="en-US" altLang="en-US"/>
               <a:t>index</a:t>
             </a:r>
-            <a:endParaRPr lang="" altLang="en-US"/>
+            <a:endParaRPr lang="en-US" altLang="en-US"/>
           </a:p>
           <a:p>
             <a:pPr lvl="2"/>
             <a:r>
-              <a:rPr lang="" altLang="en-US" sz="1600"/>
+              <a:rPr lang="en-US" altLang="en-US" sz="1600"/>
               <a:t>keeps track of changes (and what to change with commits)</a:t>
             </a:r>
-            <a:endParaRPr lang="" altLang="en-US"/>
+            <a:endParaRPr lang="en-US" altLang="en-US"/>
           </a:p>
           <a:p>
             <a:pPr lvl="1"/>
             <a:r>
-              <a:rPr lang="" altLang="en-US"/>
+              <a:rPr lang="en-US" altLang="en-US"/>
               <a:t>local workspace</a:t>
             </a:r>
-            <a:endParaRPr lang="" altLang="en-US"/>
+            <a:endParaRPr lang="en-US" altLang="en-US"/>
           </a:p>
           <a:p>
             <a:pPr lvl="2"/>
             <a:r>
-              <a:rPr lang="" altLang="en-US" sz="1600"/>
+              <a:rPr lang="en-US" altLang="en-US" sz="1600"/>
               <a:t>the actual files and folders you are working on/in</a:t>
             </a:r>
-            <a:endParaRPr lang="" altLang="en-US"/>
+            <a:endParaRPr lang="en-US" altLang="en-US"/>
           </a:p>
           <a:p>
             <a:pPr lvl="1"/>
             <a:r>
-              <a:rPr lang="" altLang="en-US"/>
+              <a:rPr lang="en-US" altLang="en-US"/>
               <a:t>(stash)</a:t>
             </a:r>
-            <a:endParaRPr lang="" altLang="en-US"/>
+            <a:endParaRPr lang="en-US" altLang="en-US"/>
           </a:p>
           <a:p>
             <a:pPr lvl="2"/>
             <a:r>
-              <a:rPr lang="" altLang="en-US" sz="1600"/>
+              <a:rPr lang="en-US" altLang="en-US" sz="1600"/>
               <a:t>save changes for later, or discard, can be “pop”’ed to applied again/merged</a:t>
             </a:r>
-            <a:endParaRPr lang="" altLang="en-US"/>
+            <a:endParaRPr lang="en-US" altLang="en-US"/>
           </a:p>
           <a:p>
             <a:pPr lvl="0"/>
             <a:r>
-              <a:rPr lang="" altLang="en-US" sz="2000"/>
+              <a:rPr lang="en-US" altLang="en-US" sz="2000"/>
               <a:t>Branches persist through all phases, useful for testing/development/variations</a:t>
             </a:r>
             <a:endParaRPr lang="en-US" altLang="en-US"/>
           </a:p>
           <a:p>
             <a:pPr lvl="0"/>
-            <a:endParaRPr lang="" altLang="en-US"/>
+            <a:endParaRPr lang="en-US" altLang="en-US"/>
           </a:p>
         </p:txBody>
       </p:sp>
@@ -4374,10 +4586,10 @@
           <a:bodyPr/>
           <a:p>
             <a:r>
-              <a:rPr lang="" altLang="en-US"/>
+              <a:rPr lang="en-US" altLang="en-US"/>
               <a:t>Git basics</a:t>
             </a:r>
-            <a:endParaRPr lang="" altLang="en-US"/>
+            <a:endParaRPr lang="en-US" altLang="en-US"/>
           </a:p>
         </p:txBody>
       </p:sp>
@@ -4401,10 +4613,10 @@
               <a:buNone/>
             </a:pPr>
             <a:r>
-              <a:rPr lang="" altLang="en-US"/>
+              <a:rPr lang="en-US" altLang="en-US"/>
               <a:t>Most vital commands / keywords:</a:t>
             </a:r>
-            <a:endParaRPr lang="" altLang="en-US"/>
+            <a:endParaRPr lang="en-US" altLang="en-US"/>
           </a:p>
           <a:p>
             <a:r>
@@ -4413,46 +4625,32 @@
                 <a:cs typeface="FreeMono" panose="020F0409020205020404" charset="0"/>
                 <a:sym typeface="+mn-ea"/>
               </a:rPr>
-              <a:t>$ git </a:t>
-            </a:r>
-            <a:r>
-              <a:rPr lang="" altLang="en-US" b="1">
-                <a:latin typeface="FreeMono" panose="020F0409020205020404" charset="0"/>
-                <a:cs typeface="FreeMono" panose="020F0409020205020404" charset="0"/>
-                <a:sym typeface="+mn-ea"/>
-              </a:rPr>
-              <a:t>init [name]</a:t>
+              <a:t>$ git init [name]</a:t>
             </a:r>
             <a:r>
               <a:rPr lang="en-US" altLang="en-US">
                 <a:sym typeface="+mn-ea"/>
               </a:rPr>
-              <a:t>: </a:t>
-            </a:r>
-            <a:r>
-              <a:rPr lang="" altLang="en-US">
-                <a:sym typeface="+mn-ea"/>
-              </a:rPr>
-              <a:t>create an empty repo. Easier to create repo on github.com if that’s where the origin will be, then clone it locally</a:t>
-            </a:r>
-            <a:endParaRPr lang="" altLang="en-US" b="1">
+              <a:t>: create an empty repo. Easier to create repo on github.com if that’s where the origin will be, then clone it locally</a:t>
+            </a:r>
+            <a:endParaRPr lang="en-US" altLang="en-US" b="1">
               <a:latin typeface="FreeMono" panose="020F0409020205020404" charset="0"/>
               <a:cs typeface="FreeMono" panose="020F0409020205020404" charset="0"/>
             </a:endParaRPr>
           </a:p>
           <a:p>
             <a:r>
-              <a:rPr lang="" altLang="en-US" b="1">
+              <a:rPr lang="en-US" altLang="en-US" b="1">
                 <a:latin typeface="FreeMono" panose="020F0409020205020404" charset="0"/>
                 <a:cs typeface="FreeMono" panose="020F0409020205020404" charset="0"/>
               </a:rPr>
               <a:t>$ git clone [url]</a:t>
             </a:r>
             <a:r>
-              <a:rPr lang="" altLang="en-US"/>
+              <a:rPr lang="en-US" altLang="en-US"/>
               <a:t>: clone/copy a repo from a remote</a:t>
             </a:r>
-            <a:endParaRPr lang="" altLang="en-US"/>
+            <a:endParaRPr lang="en-US" altLang="en-US"/>
           </a:p>
           <a:p>
             <a:r>
@@ -4461,27 +4659,13 @@
                 <a:cs typeface="FreeMono" panose="020F0409020205020404" charset="0"/>
                 <a:sym typeface="+mn-ea"/>
               </a:rPr>
-              <a:t>$ git </a:t>
-            </a:r>
-            <a:r>
-              <a:rPr lang="" altLang="en-US" b="1">
-                <a:latin typeface="FreeMono" panose="020F0409020205020404" charset="0"/>
-                <a:cs typeface="FreeMono" panose="020F0409020205020404" charset="0"/>
-                <a:sym typeface="+mn-ea"/>
-              </a:rPr>
-              <a:t>status</a:t>
+              <a:t>$ git status</a:t>
             </a:r>
             <a:r>
               <a:rPr lang="en-US" altLang="en-US">
                 <a:sym typeface="+mn-ea"/>
               </a:rPr>
-              <a:t>: </a:t>
-            </a:r>
-            <a:r>
-              <a:rPr lang="" altLang="en-US">
-                <a:sym typeface="+mn-ea"/>
-              </a:rPr>
-              <a:t>list changes not yet committed</a:t>
+              <a:t>: list changes not yet committed</a:t>
             </a:r>
             <a:endParaRPr lang="en-US" altLang="en-US">
               <a:sym typeface="+mn-ea"/>
@@ -4494,27 +4678,13 @@
                 <a:cs typeface="FreeMono" panose="020F0409020205020404" charset="0"/>
                 <a:sym typeface="+mn-ea"/>
               </a:rPr>
-              <a:t>$ git </a:t>
-            </a:r>
-            <a:r>
-              <a:rPr lang="" altLang="en-US" b="1">
-                <a:latin typeface="FreeMono" panose="020F0409020205020404" charset="0"/>
-                <a:cs typeface="FreeMono" panose="020F0409020205020404" charset="0"/>
-                <a:sym typeface="+mn-ea"/>
-              </a:rPr>
-              <a:t>checkout [v1.2]</a:t>
+              <a:t>$ git checkout [v1.2]</a:t>
             </a:r>
             <a:r>
               <a:rPr lang="en-US" altLang="en-US">
                 <a:sym typeface="+mn-ea"/>
               </a:rPr>
-              <a:t>: </a:t>
-            </a:r>
-            <a:r>
-              <a:rPr lang="" altLang="en-US">
-                <a:sym typeface="+mn-ea"/>
-              </a:rPr>
-              <a:t>update WD to a specific branch/commit/tag/release</a:t>
+              <a:t>: update WD to a specific branch/commit/tag/release</a:t>
             </a:r>
             <a:endParaRPr lang="en-US" altLang="en-US"/>
           </a:p>
@@ -4525,27 +4695,13 @@
                 <a:cs typeface="FreeMono" panose="020F0409020205020404" charset="0"/>
                 <a:sym typeface="+mn-ea"/>
               </a:rPr>
-              <a:t>$ git </a:t>
-            </a:r>
-            <a:r>
-              <a:rPr lang="" altLang="en-US" b="1">
-                <a:latin typeface="FreeMono" panose="020F0409020205020404" charset="0"/>
-                <a:cs typeface="FreeMono" panose="020F0409020205020404" charset="0"/>
-                <a:sym typeface="+mn-ea"/>
-              </a:rPr>
-              <a:t>add [file]</a:t>
+              <a:t>$ git add [file]</a:t>
             </a:r>
             <a:r>
               <a:rPr lang="en-US" altLang="en-US">
                 <a:sym typeface="+mn-ea"/>
               </a:rPr>
-              <a:t>: </a:t>
-            </a:r>
-            <a:r>
-              <a:rPr lang="" altLang="en-US">
-                <a:sym typeface="+mn-ea"/>
-              </a:rPr>
-              <a:t>add a file to the staging area (to be committed)</a:t>
+              <a:t>: add a file to the staging area (to be committed)</a:t>
             </a:r>
             <a:endParaRPr lang="en-US" altLang="en-US"/>
           </a:p>
@@ -4556,29 +4712,15 @@
                 <a:cs typeface="FreeMono" panose="020F0409020205020404" charset="0"/>
                 <a:sym typeface="+mn-ea"/>
               </a:rPr>
-              <a:t>$ git c</a:t>
-            </a:r>
-            <a:r>
-              <a:rPr lang="" altLang="en-US" b="1">
-                <a:latin typeface="FreeMono" panose="020F0409020205020404" charset="0"/>
-                <a:cs typeface="FreeMono" panose="020F0409020205020404" charset="0"/>
-                <a:sym typeface="+mn-ea"/>
-              </a:rPr>
-              <a:t>ommit -m [“message”]</a:t>
+              <a:t>$ git commit -m [“message”]</a:t>
             </a:r>
             <a:r>
               <a:rPr lang="en-US" altLang="en-US">
                 <a:sym typeface="+mn-ea"/>
               </a:rPr>
-              <a:t>: </a:t>
-            </a:r>
-            <a:r>
-              <a:rPr lang="" altLang="en-US">
-                <a:sym typeface="+mn-ea"/>
-              </a:rPr>
-              <a:t>commit changes in staging area with message</a:t>
-            </a:r>
-            <a:endParaRPr lang="" altLang="en-US">
+              <a:t>: commit changes in staging area with message</a:t>
+            </a:r>
+            <a:endParaRPr lang="en-US" altLang="en-US">
               <a:sym typeface="+mn-ea"/>
             </a:endParaRPr>
           </a:p>
@@ -4625,50 +4767,36 @@
                 <a:cs typeface="FreeMono" panose="020F0409020205020404" charset="0"/>
                 <a:sym typeface="+mn-ea"/>
               </a:rPr>
-              <a:t>$ git </a:t>
-            </a:r>
-            <a:r>
-              <a:rPr lang="" altLang="en-US" b="1">
-                <a:latin typeface="FreeMono" panose="020F0409020205020404" charset="0"/>
-                <a:cs typeface="FreeMono" panose="020F0409020205020404" charset="0"/>
-                <a:sym typeface="+mn-ea"/>
-              </a:rPr>
-              <a:t>push</a:t>
+              <a:t>$ git push</a:t>
             </a:r>
             <a:r>
               <a:rPr lang="en-US" altLang="en-US">
                 <a:sym typeface="+mn-ea"/>
               </a:rPr>
-              <a:t>: </a:t>
-            </a:r>
-            <a:r>
-              <a:rPr lang="" altLang="en-US">
-                <a:sym typeface="+mn-ea"/>
-              </a:rPr>
-              <a:t>push changes from local repo to remote/origin repo</a:t>
-            </a:r>
-            <a:endParaRPr lang="en-US" altLang="en-US"/>
-          </a:p>
-          <a:p>
-            <a:endParaRPr lang="" altLang="en-US"/>
+              <a:t>: push changes from local repo to remote/origin repo</a:t>
+            </a:r>
+            <a:endParaRPr lang="en-US" altLang="en-US"/>
+          </a:p>
+          <a:p>
+            <a:endParaRPr lang="en-US" altLang="en-US"/>
           </a:p>
           <a:p>
             <a:pPr marL="0" indent="0">
               <a:buNone/>
             </a:pPr>
-            <a:endParaRPr lang="" altLang="en-US"/>
+            <a:endParaRPr lang="en-US" altLang="en-US"/>
           </a:p>
           <a:p>
             <a:pPr marL="0" indent="0">
               <a:buNone/>
             </a:pPr>
-            <a:endParaRPr lang="" altLang="en-US"/>
+            <a:endParaRPr lang="en-US" altLang="en-US"/>
           </a:p>
           <a:p>
             <a:pPr marL="0" indent="0">
               <a:buNone/>
             </a:pPr>
-            <a:endParaRPr lang="" altLang="en-US"/>
+            <a:endParaRPr lang="en-US" altLang="en-US"/>
           </a:p>
         </p:txBody>
       </p:sp>
@@ -4739,16 +4867,10 @@
               <a:buNone/>
             </a:pPr>
             <a:r>
-              <a:rPr lang="" altLang="en-US">
-                <a:sym typeface="+mn-ea"/>
-              </a:rPr>
-              <a:t>CLI </a:t>
-            </a:r>
-            <a:r>
               <a:rPr lang="en-US" altLang="en-US">
                 <a:sym typeface="+mn-ea"/>
               </a:rPr>
-              <a:t>cheat sheet here: </a:t>
+              <a:t>CLI cheat sheet here: </a:t>
             </a:r>
             <a:r>
               <a:rPr lang="en-US" altLang="en-US">
@@ -4761,15 +4883,9 @@
               <a:rPr lang="en-US" altLang="en-US">
                 <a:sym typeface="+mn-ea"/>
               </a:rPr>
-              <a:t> </a:t>
-            </a:r>
-            <a:r>
-              <a:rPr lang="" altLang="en-US">
-                <a:sym typeface="+mn-ea"/>
-              </a:rPr>
-              <a:t>(just use a GUI)</a:t>
-            </a:r>
-            <a:endParaRPr lang="" altLang="en-US">
+              <a:t> (just use a GUI)</a:t>
+            </a:r>
+            <a:endParaRPr lang="en-US" altLang="en-US">
               <a:sym typeface="+mn-ea"/>
             </a:endParaRPr>
           </a:p>
@@ -4797,10 +4913,10 @@
           </a:bodyPr>
           <a:p>
             <a:r>
-              <a:rPr lang="" altLang="en-US"/>
+              <a:rPr lang="en-US" altLang="en-US"/>
               <a:t>pull</a:t>
             </a:r>
-            <a:endParaRPr lang="" altLang="en-US"/>
+            <a:endParaRPr lang="en-US" altLang="en-US"/>
           </a:p>
         </p:txBody>
       </p:sp>
@@ -4882,10 +4998,10 @@
           <a:bodyPr/>
           <a:p>
             <a:r>
-              <a:rPr lang="" altLang="en-US"/>
+              <a:rPr lang="en-US" altLang="en-US"/>
               <a:t>Git GUI clients</a:t>
             </a:r>
-            <a:endParaRPr lang="" altLang="en-US"/>
+            <a:endParaRPr lang="en-US" altLang="en-US"/>
           </a:p>
         </p:txBody>
       </p:sp>
@@ -4930,19 +5046,7 @@
               <a:rPr lang="en-US" altLang="en-US">
                 <a:sym typeface="+mn-ea"/>
               </a:rPr>
-              <a:t>* gitkraken (best cross platform imo</a:t>
-            </a:r>
-            <a:r>
-              <a:rPr lang="" altLang="en-US">
-                <a:sym typeface="+mn-ea"/>
-              </a:rPr>
-              <a:t>, has nice extras, free pro version through the github student pack https://education.github.com/pack + others</a:t>
-            </a:r>
-            <a:r>
-              <a:rPr lang="en-US" altLang="en-US">
-                <a:sym typeface="+mn-ea"/>
-              </a:rPr>
-              <a:t>)</a:t>
+              <a:t>* gitkraken (best cross platform imo, has nice extras, free pro version through the github student pack https://education.github.com/pack + others)</a:t>
             </a:r>
             <a:endParaRPr lang="en-US" altLang="en-US"/>
           </a:p>
@@ -4990,13 +5094,7 @@
               <a:rPr lang="en-US" altLang="en-US">
                 <a:sym typeface="+mn-ea"/>
               </a:rPr>
-              <a:t>* = </a:t>
-            </a:r>
-            <a:r>
-              <a:rPr lang="en-US" altLang="en-US">
-                <a:sym typeface="+mn-ea"/>
-              </a:rPr>
-              <a:t>supports pull requests</a:t>
+              <a:t>* = supports pull requests</a:t>
             </a:r>
             <a:endParaRPr lang="en-US"/>
           </a:p>
@@ -5139,10 +5237,10 @@
           <a:bodyPr/>
           <a:p>
             <a:r>
-              <a:rPr lang="" altLang="en-US"/>
+              <a:rPr lang="en-US" altLang="en-US"/>
               <a:t>Git best practices</a:t>
             </a:r>
-            <a:endParaRPr lang="" altLang="en-US"/>
+            <a:endParaRPr lang="en-US" altLang="en-US"/>
           </a:p>
         </p:txBody>
       </p:sp>
@@ -5163,82 +5261,82 @@
           </a:bodyPr>
           <a:p>
             <a:r>
-              <a:rPr lang="" altLang="en-US"/>
+              <a:rPr lang="en-US" altLang="en-US"/>
               <a:t>Make meaningful commit messages! </a:t>
             </a:r>
-            <a:endParaRPr lang="" altLang="en-US"/>
+            <a:endParaRPr lang="en-US" altLang="en-US"/>
           </a:p>
           <a:p>
             <a:pPr lvl="1"/>
             <a:r>
-              <a:rPr lang="" altLang="en-US" sz="1800"/>
+              <a:rPr lang="en-US" altLang="en-US" sz="1800"/>
               <a:t>It’s a summary of certain changes</a:t>
             </a:r>
-            <a:endParaRPr lang="" altLang="en-US"/>
+            <a:endParaRPr lang="en-US" altLang="en-US"/>
           </a:p>
           <a:p>
             <a:pPr lvl="1"/>
             <a:r>
-              <a:rPr lang="" altLang="en-US" sz="1800"/>
+              <a:rPr lang="en-US" altLang="en-US" sz="1800"/>
               <a:t>The problem/addition should be clear from the message, and keep different problems/additions in separate commits</a:t>
             </a:r>
-            <a:endParaRPr lang="" altLang="en-US"/>
+            <a:endParaRPr lang="en-US" altLang="en-US"/>
           </a:p>
           <a:p>
             <a:pPr lvl="1"/>
             <a:r>
-              <a:rPr lang="" altLang="en-US"/>
+              <a:rPr lang="en-US" altLang="en-US"/>
               <a:t>fx “updated script” is meaningless, it’s obvious since you just committed, use instead: “added feature xx”, “fixed bug #10”, “changed default setting x to y” etc</a:t>
             </a:r>
-            <a:endParaRPr lang="" altLang="en-US"/>
+            <a:endParaRPr lang="en-US" altLang="en-US"/>
           </a:p>
           <a:p>
             <a:pPr lvl="0"/>
             <a:r>
-              <a:rPr lang="" altLang="en-US"/>
+              <a:rPr lang="en-US" altLang="en-US"/>
               <a:t>Commit early, commit often!</a:t>
             </a:r>
-            <a:endParaRPr lang="" altLang="en-US"/>
+            <a:endParaRPr lang="en-US" altLang="en-US"/>
           </a:p>
           <a:p>
             <a:pPr lvl="1"/>
             <a:r>
-              <a:rPr lang="" altLang="en-US" sz="1800"/>
+              <a:rPr lang="en-US" altLang="en-US" sz="1800"/>
               <a:t>Keep your collaborators and the rest of the world up to date</a:t>
             </a:r>
-            <a:endParaRPr lang="" altLang="en-US"/>
+            <a:endParaRPr lang="en-US" altLang="en-US"/>
           </a:p>
           <a:p>
             <a:pPr lvl="1"/>
             <a:r>
-              <a:rPr lang="" altLang="en-US"/>
+              <a:rPr lang="en-US" altLang="en-US"/>
               <a:t>Break down larger changes into separate commits if possible, you don’t have to commit one file as one whole commit. It only takes a second to select particular lines related to a (one!) problem if using a git GUI app</a:t>
             </a:r>
-            <a:endParaRPr lang="" altLang="en-US"/>
+            <a:endParaRPr lang="en-US" altLang="en-US"/>
           </a:p>
           <a:p>
             <a:pPr lvl="0"/>
             <a:r>
-              <a:rPr lang="" altLang="en-US"/>
+              <a:rPr lang="en-US" altLang="en-US"/>
               <a:t>Don’t commit half-done or untested work</a:t>
             </a:r>
-            <a:endParaRPr lang="" altLang="en-US"/>
+            <a:endParaRPr lang="en-US" altLang="en-US"/>
           </a:p>
           <a:p>
             <a:pPr lvl="1"/>
             <a:r>
-              <a:rPr lang="" altLang="en-US"/>
+              <a:rPr lang="en-US" altLang="en-US"/>
               <a:t>Other people would love you for it</a:t>
             </a:r>
-            <a:endParaRPr lang="" altLang="en-US"/>
+            <a:endParaRPr lang="en-US" altLang="en-US"/>
           </a:p>
           <a:p>
             <a:pPr lvl="0"/>
             <a:r>
-              <a:rPr lang="" altLang="en-US"/>
+              <a:rPr lang="en-US" altLang="en-US"/>
               <a:t>Undocumented software is useless to others! At minimum have a repository readme with usage, installation, features, examples, etc</a:t>
             </a:r>
-            <a:endParaRPr lang="" altLang="en-US"/>
+            <a:endParaRPr lang="en-US" altLang="en-US"/>
           </a:p>
         </p:txBody>
       </p:sp>

</xml_diff>